<commit_message>
Add vertex lstm with masking
</commit_message>
<xml_diff>
--- a/Analysis/RAVE/Vertexing analysis.pptx
+++ b/Analysis/RAVE/Vertexing analysis.pptx
@@ -12,7 +12,9 @@
     <p:sldId id="261" r:id="rId6"/>
     <p:sldId id="262" r:id="rId7"/>
     <p:sldId id="263" r:id="rId8"/>
-    <p:sldId id="259" r:id="rId9"/>
+    <p:sldId id="264" r:id="rId9"/>
+    <p:sldId id="265" r:id="rId10"/>
+    <p:sldId id="259" r:id="rId11"/>
   </p:sldIdLst>
   <p:sldSz cx="12192000" cy="6858000"/>
   <p:notesSz cx="6858000" cy="9144000"/>
@@ -111,6 +113,11 @@
       </a:defRPr>
     </a:lvl9pPr>
   </p:defaultTextStyle>
+  <p:extLst>
+    <p:ext uri="{EFAFB233-063F-42B5-8137-9DF3F51BA10A}">
+      <p15:sldGuideLst xmlns:p15="http://schemas.microsoft.com/office/powerpoint/2012/main"/>
+    </p:ext>
+  </p:extLst>
 </p:presentation>
 </file>
 
@@ -3455,6 +3462,117 @@
 </p:sld>
 </file>
 
+<file path=ppt/slides/slide10.xml><?xml version="1.0" encoding="utf-8"?>
+<p:sld xmlns:a="http://schemas.openxmlformats.org/drawingml/2006/main" xmlns:r="http://schemas.openxmlformats.org/officeDocument/2006/relationships" xmlns:p="http://schemas.openxmlformats.org/presentationml/2006/main">
+  <p:cSld>
+    <p:spTree>
+      <p:nvGrpSpPr>
+        <p:cNvPr id="1" name=""/>
+        <p:cNvGrpSpPr/>
+        <p:nvPr/>
+      </p:nvGrpSpPr>
+      <p:grpSpPr>
+        <a:xfrm>
+          <a:off x="0" y="0"/>
+          <a:ext cx="0" cy="0"/>
+          <a:chOff x="0" y="0"/>
+          <a:chExt cx="0" cy="0"/>
+        </a:xfrm>
+      </p:grpSpPr>
+      <p:sp>
+        <p:nvSpPr>
+          <p:cNvPr id="2" name="Title 1">
+            <a:extLst>
+              <a:ext uri="{FF2B5EF4-FFF2-40B4-BE49-F238E27FC236}">
+                <a16:creationId xmlns:a16="http://schemas.microsoft.com/office/drawing/2014/main" id="{EF95E689-3E76-4487-8440-CADE298AB503}"/>
+              </a:ext>
+            </a:extLst>
+          </p:cNvPr>
+          <p:cNvSpPr>
+            <a:spLocks noGrp="1"/>
+          </p:cNvSpPr>
+          <p:nvPr>
+            <p:ph type="title"/>
+          </p:nvPr>
+        </p:nvSpPr>
+        <p:spPr/>
+        <p:txBody>
+          <a:bodyPr/>
+          <a:lstStyle/>
+          <a:p>
+            <a:r>
+              <a:rPr lang="en-US" dirty="0"/>
+              <a:t>Further questions</a:t>
+            </a:r>
+          </a:p>
+        </p:txBody>
+      </p:sp>
+      <p:sp>
+        <p:nvSpPr>
+          <p:cNvPr id="3" name="Content Placeholder 2">
+            <a:extLst>
+              <a:ext uri="{FF2B5EF4-FFF2-40B4-BE49-F238E27FC236}">
+                <a16:creationId xmlns:a16="http://schemas.microsoft.com/office/drawing/2014/main" id="{AEB49255-83FE-4579-A236-959FAAE02FC6}"/>
+              </a:ext>
+            </a:extLst>
+          </p:cNvPr>
+          <p:cNvSpPr>
+            <a:spLocks noGrp="1"/>
+          </p:cNvSpPr>
+          <p:nvPr>
+            <p:ph idx="1"/>
+          </p:nvPr>
+        </p:nvSpPr>
+        <p:spPr/>
+        <p:txBody>
+          <a:bodyPr/>
+          <a:lstStyle/>
+          <a:p>
+            <a:r>
+              <a:rPr lang="en-US" dirty="0"/>
+              <a:t>Should a cut be implemented on vertices?</a:t>
+            </a:r>
+          </a:p>
+          <a:p>
+            <a:pPr lvl="1"/>
+            <a:r>
+              <a:rPr lang="en-US" dirty="0" err="1"/>
+              <a:t>Chisq</a:t>
+            </a:r>
+            <a:r>
+              <a:rPr lang="en-US" dirty="0"/>
+              <a:t> cut?</a:t>
+            </a:r>
+          </a:p>
+          <a:p>
+            <a:pPr lvl="1"/>
+            <a:r>
+              <a:rPr lang="en-US" dirty="0"/>
+              <a:t>Multiplicity cut?</a:t>
+            </a:r>
+          </a:p>
+          <a:p>
+            <a:pPr lvl="1"/>
+            <a:r>
+              <a:rPr lang="en-US" dirty="0"/>
+              <a:t>Only vertices not shared by jets?</a:t>
+            </a:r>
+          </a:p>
+        </p:txBody>
+      </p:sp>
+    </p:spTree>
+    <p:extLst>
+      <p:ext uri="{BB962C8B-B14F-4D97-AF65-F5344CB8AC3E}">
+        <p14:creationId xmlns:p14="http://schemas.microsoft.com/office/powerpoint/2010/main" val="3172442810"/>
+      </p:ext>
+    </p:extLst>
+  </p:cSld>
+  <p:clrMapOvr>
+    <a:masterClrMapping/>
+  </p:clrMapOvr>
+</p:sld>
+</file>
+
 <file path=ppt/slides/slide2.xml><?xml version="1.0" encoding="utf-8"?>
 <p:sld xmlns:a="http://schemas.openxmlformats.org/drawingml/2006/main" xmlns:r="http://schemas.openxmlformats.org/officeDocument/2006/relationships" xmlns:p="http://schemas.openxmlformats.org/presentationml/2006/main">
   <p:cSld>
@@ -4209,7 +4327,7 @@
           <p:cNvPr id="2" name="Title 1">
             <a:extLst>
               <a:ext uri="{FF2B5EF4-FFF2-40B4-BE49-F238E27FC236}">
-                <a16:creationId xmlns:a16="http://schemas.microsoft.com/office/drawing/2014/main" id="{EF95E689-3E76-4487-8440-CADE298AB503}"/>
+                <a16:creationId xmlns:a16="http://schemas.microsoft.com/office/drawing/2014/main" id="{277A0B97-CB3E-4711-8A75-594DF78AEC02}"/>
               </a:ext>
             </a:extLst>
           </p:cNvPr>
@@ -4227,25 +4345,62 @@
           <a:p>
             <a:r>
               <a:rPr lang="en-US" dirty="0"/>
-              <a:t>Further questions</a:t>
-            </a:r>
-          </a:p>
-        </p:txBody>
-      </p:sp>
-      <p:sp>
-        <p:nvSpPr>
-          <p:cNvPr id="3" name="Content Placeholder 2">
-            <a:extLst>
-              <a:ext uri="{FF2B5EF4-FFF2-40B4-BE49-F238E27FC236}">
-                <a16:creationId xmlns:a16="http://schemas.microsoft.com/office/drawing/2014/main" id="{AEB49255-83FE-4579-A236-959FAAE02FC6}"/>
-              </a:ext>
-            </a:extLst>
-          </p:cNvPr>
-          <p:cNvSpPr>
-            <a:spLocks noGrp="1"/>
-          </p:cNvSpPr>
-          <p:nvPr>
-            <p:ph idx="1"/>
+              <a:t>Primary vertex displacement</a:t>
+            </a:r>
+          </a:p>
+        </p:txBody>
+      </p:sp>
+      <p:pic>
+        <p:nvPicPr>
+          <p:cNvPr id="6" name="Picture Placeholder 5">
+            <a:extLst>
+              <a:ext uri="{FF2B5EF4-FFF2-40B4-BE49-F238E27FC236}">
+                <a16:creationId xmlns:a16="http://schemas.microsoft.com/office/drawing/2014/main" id="{2A938458-0B0C-4E73-B64B-734D97983994}"/>
+              </a:ext>
+            </a:extLst>
+          </p:cNvPr>
+          <p:cNvPicPr>
+            <a:picLocks noGrp="1" noChangeAspect="1"/>
+          </p:cNvPicPr>
+          <p:nvPr>
+            <p:ph type="pic" idx="1"/>
+          </p:nvPr>
+        </p:nvPicPr>
+        <p:blipFill rotWithShape="1">
+          <a:blip r:embed="rId2">
+            <a:extLst>
+              <a:ext uri="{28A0092B-C50C-407E-A947-70E740481C1C}">
+                <a14:useLocalDpi xmlns:a14="http://schemas.microsoft.com/office/drawing/2010/main" val="0"/>
+              </a:ext>
+              <a:ext uri="{96DAC541-7B7A-43D3-8B79-37D633B846F1}">
+                <asvg:svgBlip xmlns:asvg="http://schemas.microsoft.com/office/drawing/2016/SVG/main" r:embed="rId3"/>
+              </a:ext>
+            </a:extLst>
+          </a:blip>
+          <a:srcRect t="11228" b="10520"/>
+          <a:stretch/>
+        </p:blipFill>
+        <p:spPr>
+          <a:xfrm>
+            <a:off x="4772025" y="600076"/>
+            <a:ext cx="6733195" cy="5268912"/>
+          </a:xfrm>
+        </p:spPr>
+      </p:pic>
+      <p:sp>
+        <p:nvSpPr>
+          <p:cNvPr id="4" name="Text Placeholder 3">
+            <a:extLst>
+              <a:ext uri="{FF2B5EF4-FFF2-40B4-BE49-F238E27FC236}">
+                <a16:creationId xmlns:a16="http://schemas.microsoft.com/office/drawing/2014/main" id="{40300EC6-5A3C-4A24-BD7F-5AC761E694E8}"/>
+              </a:ext>
+            </a:extLst>
+          </p:cNvPr>
+          <p:cNvSpPr>
+            <a:spLocks noGrp="1"/>
+          </p:cNvSpPr>
+          <p:nvPr>
+            <p:ph type="body" sz="half" idx="2"/>
           </p:nvPr>
         </p:nvSpPr>
         <p:spPr/>
@@ -4255,25 +4410,7 @@
           <a:p>
             <a:r>
               <a:rPr lang="en-US" dirty="0"/>
-              <a:t>Should a cut be implemented on vertices?</a:t>
-            </a:r>
-          </a:p>
-          <a:p>
-            <a:pPr lvl="1"/>
-            <a:r>
-              <a:rPr lang="en-US" dirty="0" err="1"/>
-              <a:t>Chisq</a:t>
-            </a:r>
-            <a:r>
-              <a:rPr lang="en-US" dirty="0"/>
-              <a:t> cut?</a:t>
-            </a:r>
-          </a:p>
-          <a:p>
-            <a:pPr lvl="1"/>
-            <a:r>
-              <a:rPr lang="en-US" dirty="0"/>
-              <a:t>Multiplicity cut?</a:t>
+              <a:t>Signal slightly more displaced</a:t>
             </a:r>
           </a:p>
         </p:txBody>
@@ -4281,7 +4418,127 @@
     </p:spTree>
     <p:extLst>
       <p:ext uri="{BB962C8B-B14F-4D97-AF65-F5344CB8AC3E}">
-        <p14:creationId xmlns:p14="http://schemas.microsoft.com/office/powerpoint/2010/main" val="3172442810"/>
+        <p14:creationId xmlns:p14="http://schemas.microsoft.com/office/powerpoint/2010/main" val="1625457791"/>
+      </p:ext>
+    </p:extLst>
+  </p:cSld>
+  <p:clrMapOvr>
+    <a:masterClrMapping/>
+  </p:clrMapOvr>
+</p:sld>
+</file>
+
+<file path=ppt/slides/slide9.xml><?xml version="1.0" encoding="utf-8"?>
+<p:sld xmlns:a="http://schemas.openxmlformats.org/drawingml/2006/main" xmlns:r="http://schemas.openxmlformats.org/officeDocument/2006/relationships" xmlns:p="http://schemas.openxmlformats.org/presentationml/2006/main">
+  <p:cSld>
+    <p:spTree>
+      <p:nvGrpSpPr>
+        <p:cNvPr id="1" name=""/>
+        <p:cNvGrpSpPr/>
+        <p:nvPr/>
+      </p:nvGrpSpPr>
+      <p:grpSpPr>
+        <a:xfrm>
+          <a:off x="0" y="0"/>
+          <a:ext cx="0" cy="0"/>
+          <a:chOff x="0" y="0"/>
+          <a:chExt cx="0" cy="0"/>
+        </a:xfrm>
+      </p:grpSpPr>
+      <p:sp>
+        <p:nvSpPr>
+          <p:cNvPr id="2" name="Title 1">
+            <a:extLst>
+              <a:ext uri="{FF2B5EF4-FFF2-40B4-BE49-F238E27FC236}">
+                <a16:creationId xmlns:a16="http://schemas.microsoft.com/office/drawing/2014/main" id="{277A0B97-CB3E-4711-8A75-594DF78AEC02}"/>
+              </a:ext>
+            </a:extLst>
+          </p:cNvPr>
+          <p:cNvSpPr>
+            <a:spLocks noGrp="1"/>
+          </p:cNvSpPr>
+          <p:nvPr>
+            <p:ph type="title"/>
+          </p:nvPr>
+        </p:nvSpPr>
+        <p:spPr/>
+        <p:txBody>
+          <a:bodyPr/>
+          <a:lstStyle/>
+          <a:p>
+            <a:r>
+              <a:rPr lang="en-US" dirty="0"/>
+              <a:t>Secondary vertex displacement</a:t>
+            </a:r>
+          </a:p>
+        </p:txBody>
+      </p:sp>
+      <p:sp>
+        <p:nvSpPr>
+          <p:cNvPr id="4" name="Text Placeholder 3">
+            <a:extLst>
+              <a:ext uri="{FF2B5EF4-FFF2-40B4-BE49-F238E27FC236}">
+                <a16:creationId xmlns:a16="http://schemas.microsoft.com/office/drawing/2014/main" id="{40300EC6-5A3C-4A24-BD7F-5AC761E694E8}"/>
+              </a:ext>
+            </a:extLst>
+          </p:cNvPr>
+          <p:cNvSpPr>
+            <a:spLocks noGrp="1"/>
+          </p:cNvSpPr>
+          <p:nvPr>
+            <p:ph type="body" sz="half" idx="2"/>
+          </p:nvPr>
+        </p:nvSpPr>
+        <p:spPr/>
+        <p:txBody>
+          <a:bodyPr/>
+          <a:lstStyle/>
+          <a:p>
+            <a:endParaRPr lang="en-US" dirty="0"/>
+          </a:p>
+        </p:txBody>
+      </p:sp>
+      <p:pic>
+        <p:nvPicPr>
+          <p:cNvPr id="8" name="Picture Placeholder 7">
+            <a:extLst>
+              <a:ext uri="{FF2B5EF4-FFF2-40B4-BE49-F238E27FC236}">
+                <a16:creationId xmlns:a16="http://schemas.microsoft.com/office/drawing/2014/main" id="{353AB14B-D3F7-45DA-97E7-8670A61FBC67}"/>
+              </a:ext>
+            </a:extLst>
+          </p:cNvPr>
+          <p:cNvPicPr>
+            <a:picLocks noGrp="1" noChangeAspect="1"/>
+          </p:cNvPicPr>
+          <p:nvPr>
+            <p:ph type="pic" idx="1"/>
+          </p:nvPr>
+        </p:nvPicPr>
+        <p:blipFill rotWithShape="1">
+          <a:blip r:embed="rId2">
+            <a:extLst>
+              <a:ext uri="{28A0092B-C50C-407E-A947-70E740481C1C}">
+                <a14:useLocalDpi xmlns:a14="http://schemas.microsoft.com/office/drawing/2010/main" val="0"/>
+              </a:ext>
+              <a:ext uri="{96DAC541-7B7A-43D3-8B79-37D633B846F1}">
+                <asvg:svgBlip xmlns:asvg="http://schemas.microsoft.com/office/drawing/2016/SVG/main" r:embed="rId3"/>
+              </a:ext>
+            </a:extLst>
+          </a:blip>
+          <a:srcRect t="11864" b="10520"/>
+          <a:stretch/>
+        </p:blipFill>
+        <p:spPr>
+          <a:xfrm>
+            <a:off x="4900848" y="846306"/>
+            <a:ext cx="6772343" cy="5256446"/>
+          </a:xfrm>
+        </p:spPr>
+      </p:pic>
+    </p:spTree>
+    <p:extLst>
+      <p:ext uri="{BB962C8B-B14F-4D97-AF65-F5344CB8AC3E}">
+        <p14:creationId xmlns:p14="http://schemas.microsoft.com/office/powerpoint/2010/main" val="1580329595"/>
       </p:ext>
     </p:extLst>
   </p:cSld>

</xml_diff>